<commit_message>
replace yomeru with mieru
</commit_message>
<xml_diff>
--- a/img/contents.pptx
+++ b/img/contents.pptx
@@ -3489,7 +3489,14 @@
                 <a:ea typeface="HG丸ｺﾞｼｯｸM-PRO" panose="020F0600000000000000" pitchFamily="50" charset="-128"/>
                 <a:cs typeface="Courier New" pitchFamily="49" charset="0"/>
               </a:rPr>
-              <a:t>：読める</a:t>
+              <a:t>：</a:t>
+            </a:r>
+            <a:r>
+              <a:rPr lang="ja-JP" altLang="en-US" sz="1200" smtClean="0">
+                <a:ea typeface="HG丸ｺﾞｼｯｸM-PRO" panose="020F0600000000000000" pitchFamily="50" charset="-128"/>
+                <a:cs typeface="Courier New" pitchFamily="49" charset="0"/>
+              </a:rPr>
+              <a:t>見える</a:t>
             </a:r>
             <a:endParaRPr lang="ja-JP" altLang="en-US" sz="1200">
               <a:latin typeface="HG丸ｺﾞｼｯｸM-PRO" panose="020F0600000000000000" pitchFamily="50" charset="-128"/>
@@ -3567,7 +3574,14 @@
                 <a:ea typeface="HG丸ｺﾞｼｯｸM-PRO" panose="020F0600000000000000" pitchFamily="50" charset="-128"/>
                 <a:cs typeface="Courier New" pitchFamily="49" charset="0"/>
               </a:rPr>
-              <a:t>：読めない</a:t>
+              <a:t>：</a:t>
+            </a:r>
+            <a:r>
+              <a:rPr lang="ja-JP" altLang="en-US" sz="1200">
+                <a:ea typeface="HG丸ｺﾞｼｯｸM-PRO" panose="020F0600000000000000" pitchFamily="50" charset="-128"/>
+                <a:cs typeface="Courier New" pitchFamily="49" charset="0"/>
+              </a:rPr>
+              <a:t>見えない</a:t>
             </a:r>
             <a:endParaRPr lang="ja-JP" altLang="en-US" sz="1200">
               <a:latin typeface="HG丸ｺﾞｼｯｸM-PRO" panose="020F0600000000000000" pitchFamily="50" charset="-128"/>
@@ -3733,7 +3747,7 @@
                 <a:ea typeface="HG丸ｺﾞｼｯｸM-PRO" panose="020F0600000000000000" pitchFamily="50" charset="-128"/>
                 <a:cs typeface="Courier New" pitchFamily="49" charset="0"/>
               </a:rPr>
-              <a:t>ホラーでない映画がみたい</a:t>
+              <a:t>ホラーでない映画が見たい</a:t>
             </a:r>
             <a:endParaRPr lang="ja-JP" altLang="en-US" sz="1200">
               <a:latin typeface="HG丸ｺﾞｼｯｸM-PRO" panose="020F0600000000000000" pitchFamily="50" charset="-128"/>

</xml_diff>